<commit_message>
New Closure Tests and TT CR contamination
</commit_message>
<xml_diff>
--- a/Documents for Progress/topTagger_WP_mc1718_17July2019.pptx
+++ b/Documents for Progress/topTagger_WP_mc1718_17July2019.pptx
@@ -215,7 +215,7 @@
           <a:p>
             <a:fld id="{FEE00CF8-A4F8-4BB8-976B-0D5859459DEE}" type="datetime1">
               <a:rPr lang="en-GB" smtClean="0"/>
-              <a:t>17/07/2019</a:t>
+              <a:t>09/09/2019</a:t>
             </a:fld>
             <a:endParaRPr lang="en-GB"/>
           </a:p>
@@ -421,7 +421,7 @@
           <a:p>
             <a:fld id="{57BA0BFA-D588-4876-B0CE-96D0B8DE4331}" type="datetime1">
               <a:rPr lang="en-GB" smtClean="0"/>
-              <a:t>17/07/2019</a:t>
+              <a:t>09/09/2019</a:t>
             </a:fld>
             <a:endParaRPr lang="en-GB"/>
           </a:p>
@@ -755,7 +755,7 @@
           <a:p>
             <a:fld id="{32347020-43BD-4614-839E-5DE0684EF482}" type="datetime1">
               <a:rPr lang="en-GB" smtClean="0"/>
-              <a:t>17/07/2019</a:t>
+              <a:t>09/09/2019</a:t>
             </a:fld>
             <a:endParaRPr lang="en-GB"/>
           </a:p>
@@ -1023,7 +1023,7 @@
           <a:p>
             <a:fld id="{D3065AEF-CB34-4A7D-AE93-DF93C764F351}" type="datetime1">
               <a:rPr lang="en-US" smtClean="0"/>
-              <a:t>7/17/2019</a:t>
+              <a:t>9/9/2019</a:t>
             </a:fld>
             <a:endParaRPr lang="en-US" dirty="0"/>
           </a:p>
@@ -1230,7 +1230,7 @@
           <a:p>
             <a:fld id="{64373F58-7AE8-49E2-A5B1-8DB1E8778A7B}" type="datetime1">
               <a:rPr lang="en-US" smtClean="0"/>
-              <a:t>7/17/2019</a:t>
+              <a:t>9/9/2019</a:t>
             </a:fld>
             <a:endParaRPr lang="en-US" dirty="0"/>
           </a:p>
@@ -1485,7 +1485,7 @@
           <a:p>
             <a:fld id="{3ADC0DD9-38B3-495C-BDB7-6282ACC62B2A}" type="datetime1">
               <a:rPr lang="en-US" smtClean="0"/>
-              <a:t>7/17/2019</a:t>
+              <a:t>9/9/2019</a:t>
             </a:fld>
             <a:endParaRPr lang="en-US" dirty="0"/>
           </a:p>
@@ -1676,7 +1676,7 @@
           <a:p>
             <a:fld id="{4E33492F-8FC9-4ABD-99DF-79C10901CC99}" type="datetime1">
               <a:rPr lang="en-US" smtClean="0"/>
-              <a:t>7/17/2019</a:t>
+              <a:t>9/9/2019</a:t>
             </a:fld>
             <a:endParaRPr lang="en-GB"/>
           </a:p>
@@ -1850,7 +1850,7 @@
           <a:p>
             <a:fld id="{DA0993C4-706A-47E5-B071-C0CEE8753B03}" type="datetime1">
               <a:rPr lang="en-US" smtClean="0"/>
-              <a:t>7/17/2019</a:t>
+              <a:t>9/9/2019</a:t>
             </a:fld>
             <a:endParaRPr lang="en-GB"/>
           </a:p>
@@ -2100,7 +2100,7 @@
           <a:p>
             <a:fld id="{F3B3715C-87AA-47EC-A0F2-1196CBEF57F8}" type="datetime1">
               <a:rPr lang="en-US" smtClean="0"/>
-              <a:t>7/17/2019</a:t>
+              <a:t>9/9/2019</a:t>
             </a:fld>
             <a:endParaRPr lang="en-GB"/>
           </a:p>
@@ -2336,7 +2336,7 @@
           <a:p>
             <a:fld id="{6198E012-054E-4E53-AA34-949E27874164}" type="datetime1">
               <a:rPr lang="en-US" smtClean="0"/>
-              <a:t>7/17/2019</a:t>
+              <a:t>9/9/2019</a:t>
             </a:fld>
             <a:endParaRPr lang="en-GB"/>
           </a:p>
@@ -2707,7 +2707,7 @@
           <a:p>
             <a:fld id="{57BCF115-83D0-4833-9260-A05C743BE4D3}" type="datetime1">
               <a:rPr lang="en-US" smtClean="0"/>
-              <a:t>7/17/2019</a:t>
+              <a:t>9/9/2019</a:t>
             </a:fld>
             <a:endParaRPr lang="en-GB"/>
           </a:p>
@@ -2829,7 +2829,7 @@
           <a:p>
             <a:fld id="{D04C206A-33A2-4434-9812-22BD0A7E7722}" type="datetime1">
               <a:rPr lang="en-US" smtClean="0"/>
-              <a:t>7/17/2019</a:t>
+              <a:t>9/9/2019</a:t>
             </a:fld>
             <a:endParaRPr lang="en-GB"/>
           </a:p>
@@ -2928,7 +2928,7 @@
           <a:p>
             <a:fld id="{2A9BCF26-738E-49BB-A8D3-D025A0E4504C}" type="datetime1">
               <a:rPr lang="en-US" smtClean="0"/>
-              <a:t>7/17/2019</a:t>
+              <a:t>9/9/2019</a:t>
             </a:fld>
             <a:endParaRPr lang="en-GB"/>
           </a:p>
@@ -3209,7 +3209,7 @@
           <a:p>
             <a:fld id="{1BA747C9-E6F3-40B2-ADB7-8DB91216470A}" type="datetime1">
               <a:rPr lang="en-US" smtClean="0"/>
-              <a:t>7/17/2019</a:t>
+              <a:t>9/9/2019</a:t>
             </a:fld>
             <a:endParaRPr lang="en-GB"/>
           </a:p>
@@ -3365,7 +3365,7 @@
           <a:p>
             <a:fld id="{180784FD-6ACD-414F-B38B-A93F2CCA158F}" type="datetime1">
               <a:rPr lang="en-US" smtClean="0"/>
-              <a:t>7/17/2019</a:t>
+              <a:t>9/9/2019</a:t>
             </a:fld>
             <a:endParaRPr lang="en-US" dirty="0"/>
           </a:p>
@@ -3653,7 +3653,7 @@
           <a:p>
             <a:fld id="{1FEFB5B8-624B-4A3C-B665-7B8B445E8AA3}" type="datetime1">
               <a:rPr lang="en-US" smtClean="0"/>
-              <a:t>7/17/2019</a:t>
+              <a:t>9/9/2019</a:t>
             </a:fld>
             <a:endParaRPr lang="en-GB"/>
           </a:p>
@@ -3827,7 +3827,7 @@
           <a:p>
             <a:fld id="{7C8610C0-309F-465E-A15D-7E4A835A81BD}" type="datetime1">
               <a:rPr lang="en-US" smtClean="0"/>
-              <a:t>7/17/2019</a:t>
+              <a:t>9/9/2019</a:t>
             </a:fld>
             <a:endParaRPr lang="en-GB"/>
           </a:p>
@@ -4011,7 +4011,7 @@
           <a:p>
             <a:fld id="{4BF77126-0819-48E9-9D12-B05358AC5B9D}" type="datetime1">
               <a:rPr lang="en-US" smtClean="0"/>
-              <a:t>7/17/2019</a:t>
+              <a:t>9/9/2019</a:t>
             </a:fld>
             <a:endParaRPr lang="en-GB"/>
           </a:p>
@@ -4358,7 +4358,7 @@
           <a:p>
             <a:fld id="{82021DA8-61BD-4A44-87FD-3EBD8B70EDD9}" type="datetime1">
               <a:rPr lang="en-US" smtClean="0"/>
-              <a:t>7/17/2019</a:t>
+              <a:t>9/9/2019</a:t>
             </a:fld>
             <a:endParaRPr lang="en-US" dirty="0"/>
           </a:p>
@@ -4632,7 +4632,7 @@
           <a:p>
             <a:fld id="{61D63971-4744-43DB-90BE-A206C6B40D73}" type="datetime1">
               <a:rPr lang="en-US" smtClean="0"/>
-              <a:t>7/17/2019</a:t>
+              <a:t>9/9/2019</a:t>
             </a:fld>
             <a:endParaRPr lang="en-US" dirty="0"/>
           </a:p>
@@ -5010,7 +5010,7 @@
           <a:p>
             <a:fld id="{E8B865A5-A0E9-4970-B962-45D77BDCA061}" type="datetime1">
               <a:rPr lang="en-US" smtClean="0"/>
-              <a:t>7/17/2019</a:t>
+              <a:t>9/9/2019</a:t>
             </a:fld>
             <a:endParaRPr lang="en-US" dirty="0"/>
           </a:p>
@@ -5127,7 +5127,7 @@
           <a:p>
             <a:fld id="{3125FBE8-2953-41EC-B37A-F1044251301C}" type="datetime1">
               <a:rPr lang="en-US" smtClean="0"/>
-              <a:t>7/17/2019</a:t>
+              <a:t>9/9/2019</a:t>
             </a:fld>
             <a:endParaRPr lang="en-US" dirty="0"/>
           </a:p>
@@ -5297,7 +5297,7 @@
           <a:p>
             <a:fld id="{633AFAF4-71C0-43C8-A4A0-A57645043236}" type="datetime1">
               <a:rPr lang="en-US" smtClean="0"/>
-              <a:t>7/17/2019</a:t>
+              <a:t>9/9/2019</a:t>
             </a:fld>
             <a:endParaRPr lang="en-US" dirty="0"/>
           </a:p>
@@ -5688,7 +5688,7 @@
           <a:p>
             <a:fld id="{C3FD023E-1C56-465E-B820-E16F72FACDBC}" type="datetime1">
               <a:rPr lang="en-US" smtClean="0"/>
-              <a:t>7/17/2019</a:t>
+              <a:t>9/9/2019</a:t>
             </a:fld>
             <a:endParaRPr lang="en-US" dirty="0"/>
           </a:p>
@@ -6070,7 +6070,7 @@
           <a:p>
             <a:fld id="{4B6435FA-3DCD-4B2B-B0B9-5B3083C9FAE7}" type="datetime1">
               <a:rPr lang="en-US" smtClean="0"/>
-              <a:t>7/17/2019</a:t>
+              <a:t>9/9/2019</a:t>
             </a:fld>
             <a:endParaRPr lang="en-US" dirty="0"/>
           </a:p>
@@ -6356,7 +6356,7 @@
           <a:p>
             <a:fld id="{0639FF6A-FE3B-40B1-B091-799BBEC4E1E3}" type="datetime1">
               <a:rPr lang="en-US" smtClean="0"/>
-              <a:t>7/17/2019</a:t>
+              <a:t>9/9/2019</a:t>
             </a:fld>
             <a:endParaRPr lang="en-US" dirty="0"/>
           </a:p>
@@ -7046,7 +7046,7 @@
           <a:p>
             <a:fld id="{EB354F7C-07A2-4D5D-BA5B-269B177E903F}" type="datetime1">
               <a:rPr lang="en-US" smtClean="0"/>
-              <a:t>7/17/2019</a:t>
+              <a:t>9/9/2019</a:t>
             </a:fld>
             <a:endParaRPr lang="en-GB"/>
           </a:p>
@@ -7495,7 +7495,14 @@
             </a:br>
             <a:r>
               <a:rPr lang="en-US" sz="4400" dirty="0" smtClean="0"/>
-              <a:t>Top Tagger WP investigation for 2016, 2017 and 2018 MC’s</a:t>
+              <a:t>QCD Closure Tests</a:t>
+            </a:r>
+            <a:br>
+              <a:rPr lang="en-US" sz="4400" dirty="0" smtClean="0"/>
+            </a:br>
+            <a:r>
+              <a:rPr lang="en-US" sz="4400" dirty="0" smtClean="0"/>
+              <a:t>2016, 2017, 2018</a:t>
             </a:r>
             <a:endParaRPr lang="en-GB" sz="4400" dirty="0"/>
           </a:p>
@@ -7569,8 +7576,8 @@
         </p:nvSpPr>
         <p:spPr>
           <a:xfrm>
-            <a:off x="1240971" y="2761861"/>
-            <a:ext cx="9914709" cy="369332"/>
+            <a:off x="1233287" y="2761861"/>
+            <a:ext cx="9914709" cy="646331"/>
           </a:xfrm>
           <a:prstGeom prst="rect">
             <a:avLst/>
@@ -7586,8 +7593,32 @@
             <a:pPr algn="ctr"/>
             <a:r>
               <a:rPr lang="en-US" dirty="0" smtClean="0"/>
-              <a:t>George Bakas </a:t>
-            </a:r>
+              <a:t>George </a:t>
+            </a:r>
+            <a:r>
+              <a:rPr lang="en-US" dirty="0" smtClean="0"/>
+              <a:t>Bakas</a:t>
+            </a:r>
+          </a:p>
+          <a:p>
+            <a:pPr algn="ctr"/>
+            <a:r>
+              <a:rPr lang="en-US" dirty="0" err="1" smtClean="0"/>
+              <a:t>Ioannis</a:t>
+            </a:r>
+            <a:r>
+              <a:rPr lang="en-US" dirty="0" smtClean="0"/>
+              <a:t> </a:t>
+            </a:r>
+            <a:r>
+              <a:rPr lang="en-US" dirty="0" err="1" smtClean="0"/>
+              <a:t>Papakrivopoulos</a:t>
+            </a:r>
+            <a:r>
+              <a:rPr lang="en-US" dirty="0" smtClean="0"/>
+              <a:t> </a:t>
+            </a:r>
+            <a:endParaRPr lang="en-US" dirty="0" smtClean="0"/>
           </a:p>
         </p:txBody>
       </p:sp>
@@ -7645,7 +7676,7 @@
           <a:p>
             <a:fld id="{1886D351-0F92-4843-A875-06FC573726F4}" type="datetime1">
               <a:rPr lang="en-US" smtClean="0"/>
-              <a:t>7/17/2019</a:t>
+              <a:t>9/9/2019</a:t>
             </a:fld>
             <a:endParaRPr lang="en-US" dirty="0"/>
           </a:p>
@@ -7854,7 +7885,7 @@
           <a:p>
             <a:fld id="{3A18E56C-1685-4AF5-92C8-091432F23FB3}" type="datetime1">
               <a:rPr lang="en-US" smtClean="0"/>
-              <a:t>7/17/2019</a:t>
+              <a:t>9/9/2019</a:t>
             </a:fld>
             <a:endParaRPr lang="en-US" dirty="0"/>
           </a:p>
@@ -8066,7 +8097,7 @@
           <a:p>
             <a:fld id="{0278DFB5-D21E-4234-9D22-93B6053DC684}" type="datetime1">
               <a:rPr lang="en-US" smtClean="0"/>
-              <a:t>7/17/2019</a:t>
+              <a:t>9/9/2019</a:t>
             </a:fld>
             <a:endParaRPr lang="en-US" dirty="0"/>
           </a:p>
@@ -8275,7 +8306,7 @@
           <a:p>
             <a:fld id="{156A7AFA-FA91-43BB-B63D-9A83059E2297}" type="datetime1">
               <a:rPr lang="en-US" smtClean="0"/>
-              <a:t>7/17/2019</a:t>
+              <a:t>9/9/2019</a:t>
             </a:fld>
             <a:endParaRPr lang="en-US"/>
           </a:p>
@@ -9031,7 +9062,7 @@
         <p:spPr>
           <a:xfrm>
             <a:off x="3218826" y="1910554"/>
-            <a:ext cx="5113706" cy="2308324"/>
+            <a:ext cx="7830814" cy="2308324"/>
           </a:xfrm>
           <a:prstGeom prst="rect">
             <a:avLst/>
@@ -9209,7 +9240,7 @@
             </a:r>
             <a:r>
               <a:rPr lang="en-US" sz="1400" dirty="0" smtClean="0"/>
-              <a:t>)</a:t>
+              <a:t>) different for each year (2016: 0.2, 2017:0.0, 2018: 0.1) </a:t>
             </a:r>
             <a:endParaRPr lang="en-US" sz="1400" dirty="0"/>
           </a:p>
@@ -9224,12 +9255,25 @@
             </a:r>
             <a:r>
               <a:rPr lang="en-US" sz="1400" dirty="0"/>
-              <a:t> &gt; 120 and &lt; </a:t>
-            </a:r>
-            <a:r>
-              <a:rPr lang="en-US" sz="1400" dirty="0" smtClean="0"/>
-              <a:t>220</a:t>
-            </a:r>
+              <a:t> &gt; </a:t>
+            </a:r>
+            <a:r>
+              <a:rPr lang="en-US" sz="1400"/>
+              <a:t>120 </a:t>
+            </a:r>
+            <a:r>
+              <a:rPr lang="en-US" sz="1400" smtClean="0"/>
+              <a:t>GeV and </a:t>
+            </a:r>
+            <a:r>
+              <a:rPr lang="en-US" sz="1400"/>
+              <a:t>&lt; </a:t>
+            </a:r>
+            <a:r>
+              <a:rPr lang="en-US" sz="1400" smtClean="0"/>
+              <a:t>220 GeV</a:t>
+            </a:r>
+            <a:endParaRPr lang="en-US" sz="1400" dirty="0" smtClean="0"/>
           </a:p>
           <a:p>
             <a:endParaRPr lang="en-GB" dirty="0"/>
@@ -9642,7 +9686,7 @@
           <a:p>
             <a:fld id="{0A86CCEF-3C61-42DE-B6AA-81189FFADFF4}" type="datetime1">
               <a:rPr lang="en-US" smtClean="0"/>
-              <a:t>7/17/2019</a:t>
+              <a:t>9/9/2019</a:t>
             </a:fld>
             <a:endParaRPr lang="en-US"/>
           </a:p>
@@ -9959,7 +10003,7 @@
           <a:p>
             <a:fld id="{1ADA99A9-AF64-4C51-8102-AF6F038A1BFC}" type="datetime1">
               <a:rPr lang="en-US" smtClean="0"/>
-              <a:t>7/17/2019</a:t>
+              <a:t>9/9/2019</a:t>
             </a:fld>
             <a:endParaRPr lang="en-US" dirty="0"/>
           </a:p>
@@ -10216,7 +10260,7 @@
           <a:p>
             <a:fld id="{71FB66C7-71EE-4672-8A11-1EF8A1B0948C}" type="datetime1">
               <a:rPr lang="en-US" smtClean="0"/>
-              <a:t>7/17/2019</a:t>
+              <a:t>9/9/2019</a:t>
             </a:fld>
             <a:endParaRPr lang="en-US" dirty="0"/>
           </a:p>
@@ -10431,7 +10475,7 @@
           <a:p>
             <a:fld id="{1886D351-0F92-4843-A875-06FC573726F4}" type="datetime1">
               <a:rPr lang="en-US" smtClean="0"/>
-              <a:t>7/17/2019</a:t>
+              <a:t>9/9/2019</a:t>
             </a:fld>
             <a:endParaRPr lang="en-US" dirty="0"/>
           </a:p>
@@ -10642,7 +10686,7 @@
           <a:p>
             <a:fld id="{3A18E56C-1685-4AF5-92C8-091432F23FB3}" type="datetime1">
               <a:rPr lang="en-US" smtClean="0"/>
-              <a:t>7/17/2019</a:t>
+              <a:t>9/9/2019</a:t>
             </a:fld>
             <a:endParaRPr lang="en-US" dirty="0"/>
           </a:p>
@@ -10854,7 +10898,7 @@
           <a:p>
             <a:fld id="{0278DFB5-D21E-4234-9D22-93B6053DC684}" type="datetime1">
               <a:rPr lang="en-US" smtClean="0"/>
-              <a:t>7/17/2019</a:t>
+              <a:t>9/9/2019</a:t>
             </a:fld>
             <a:endParaRPr lang="en-US" dirty="0"/>
           </a:p>
@@ -11066,7 +11110,7 @@
           <a:p>
             <a:fld id="{71FB66C7-71EE-4672-8A11-1EF8A1B0948C}" type="datetime1">
               <a:rPr lang="en-US" smtClean="0"/>
-              <a:t>7/17/2019</a:t>
+              <a:t>9/9/2019</a:t>
             </a:fld>
             <a:endParaRPr lang="en-US" dirty="0"/>
           </a:p>

</xml_diff>